<commit_message>
Formatting added to w9
</commit_message>
<xml_diff>
--- a/Presentations/Presentation7.pptx
+++ b/Presentations/Presentation7.pptx
@@ -263,7 +263,7 @@
           <a:p>
             <a:fld id="{485EFD0E-F17F-9441-A4C1-A1AE318375DC}" type="datetimeFigureOut">
               <a:rPr lang="en-US" smtClean="0"/>
-              <a:t>2/10/21</a:t>
+              <a:t>2/11/21</a:t>
             </a:fld>
             <a:endParaRPr lang="en-US"/>
           </a:p>
@@ -463,7 +463,7 @@
           <a:p>
             <a:fld id="{485EFD0E-F17F-9441-A4C1-A1AE318375DC}" type="datetimeFigureOut">
               <a:rPr lang="en-US" smtClean="0"/>
-              <a:t>2/10/21</a:t>
+              <a:t>2/11/21</a:t>
             </a:fld>
             <a:endParaRPr lang="en-US"/>
           </a:p>
@@ -673,7 +673,7 @@
           <a:p>
             <a:fld id="{485EFD0E-F17F-9441-A4C1-A1AE318375DC}" type="datetimeFigureOut">
               <a:rPr lang="en-US" smtClean="0"/>
-              <a:t>2/10/21</a:t>
+              <a:t>2/11/21</a:t>
             </a:fld>
             <a:endParaRPr lang="en-US"/>
           </a:p>
@@ -873,7 +873,7 @@
           <a:p>
             <a:fld id="{485EFD0E-F17F-9441-A4C1-A1AE318375DC}" type="datetimeFigureOut">
               <a:rPr lang="en-US" smtClean="0"/>
-              <a:t>2/10/21</a:t>
+              <a:t>2/11/21</a:t>
             </a:fld>
             <a:endParaRPr lang="en-US"/>
           </a:p>
@@ -1149,7 +1149,7 @@
           <a:p>
             <a:fld id="{485EFD0E-F17F-9441-A4C1-A1AE318375DC}" type="datetimeFigureOut">
               <a:rPr lang="en-US" smtClean="0"/>
-              <a:t>2/10/21</a:t>
+              <a:t>2/11/21</a:t>
             </a:fld>
             <a:endParaRPr lang="en-US"/>
           </a:p>
@@ -1417,7 +1417,7 @@
           <a:p>
             <a:fld id="{485EFD0E-F17F-9441-A4C1-A1AE318375DC}" type="datetimeFigureOut">
               <a:rPr lang="en-US" smtClean="0"/>
-              <a:t>2/10/21</a:t>
+              <a:t>2/11/21</a:t>
             </a:fld>
             <a:endParaRPr lang="en-US"/>
           </a:p>
@@ -1832,7 +1832,7 @@
           <a:p>
             <a:fld id="{485EFD0E-F17F-9441-A4C1-A1AE318375DC}" type="datetimeFigureOut">
               <a:rPr lang="en-US" smtClean="0"/>
-              <a:t>2/10/21</a:t>
+              <a:t>2/11/21</a:t>
             </a:fld>
             <a:endParaRPr lang="en-US"/>
           </a:p>
@@ -1974,7 +1974,7 @@
           <a:p>
             <a:fld id="{485EFD0E-F17F-9441-A4C1-A1AE318375DC}" type="datetimeFigureOut">
               <a:rPr lang="en-US" smtClean="0"/>
-              <a:t>2/10/21</a:t>
+              <a:t>2/11/21</a:t>
             </a:fld>
             <a:endParaRPr lang="en-US"/>
           </a:p>
@@ -2087,7 +2087,7 @@
           <a:p>
             <a:fld id="{485EFD0E-F17F-9441-A4C1-A1AE318375DC}" type="datetimeFigureOut">
               <a:rPr lang="en-US" smtClean="0"/>
-              <a:t>2/10/21</a:t>
+              <a:t>2/11/21</a:t>
             </a:fld>
             <a:endParaRPr lang="en-US"/>
           </a:p>
@@ -2400,7 +2400,7 @@
           <a:p>
             <a:fld id="{485EFD0E-F17F-9441-A4C1-A1AE318375DC}" type="datetimeFigureOut">
               <a:rPr lang="en-US" smtClean="0"/>
-              <a:t>2/10/21</a:t>
+              <a:t>2/11/21</a:t>
             </a:fld>
             <a:endParaRPr lang="en-US"/>
           </a:p>
@@ -2689,7 +2689,7 @@
           <a:p>
             <a:fld id="{485EFD0E-F17F-9441-A4C1-A1AE318375DC}" type="datetimeFigureOut">
               <a:rPr lang="en-US" smtClean="0"/>
-              <a:t>2/10/21</a:t>
+              <a:t>2/11/21</a:t>
             </a:fld>
             <a:endParaRPr lang="en-US"/>
           </a:p>
@@ -2932,7 +2932,7 @@
           <a:p>
             <a:fld id="{485EFD0E-F17F-9441-A4C1-A1AE318375DC}" type="datetimeFigureOut">
               <a:rPr lang="en-US" smtClean="0"/>
-              <a:t>2/10/21</a:t>
+              <a:t>2/11/21</a:t>
             </a:fld>
             <a:endParaRPr lang="en-US"/>
           </a:p>
@@ -3937,7 +3937,7 @@
             <p:ph idx="1"/>
             <p:extLst>
               <p:ext uri="{D42A27DB-BD31-4B8C-83A1-F6EECF244321}">
-                <p14:modId xmlns:p14="http://schemas.microsoft.com/office/powerpoint/2010/main" val="1958042371"/>
+                <p14:modId xmlns:p14="http://schemas.microsoft.com/office/powerpoint/2010/main" val="4236824888"/>
               </p:ext>
             </p:extLst>
           </p:nvPr>
@@ -4700,7 +4700,11 @@
                     <a:lstStyle/>
                     <a:p>
                       <a:r>
-                        <a:rPr lang="en-US" sz="1400" dirty="0"/>
+                        <a:rPr lang="en-US" sz="1400" dirty="0">
+                          <a:solidFill>
+                            <a:schemeClr val="accent6"/>
+                          </a:solidFill>
+                        </a:rPr>
                         <a:t>Currently only neighboring tasks are considered. (Case/trace level)</a:t>
                       </a:r>
                     </a:p>

</xml_diff>